<commit_message>
add switches for channel enables
</commit_message>
<xml_diff>
--- a/lab/lab1/ECE383_Lab1_Block_Diagram.pptx
+++ b/lab/lab1/ECE383_Lab1_Block_Diagram.pptx
@@ -107,6 +107,22 @@
       </a:defRPr>
     </a:lvl9pPr>
   </p:defaultTextStyle>
+  <p:extLst>
+    <p:ext uri="{EFAFB233-063F-42B5-8137-9DF3F51BA10A}">
+      <p15:sldGuideLst xmlns:p15="http://schemas.microsoft.com/office/powerpoint/2012/main">
+        <p15:guide id="1" orient="horz" pos="4320">
+          <p15:clr>
+            <a:srgbClr val="A4A3A4"/>
+          </p15:clr>
+        </p15:guide>
+        <p15:guide id="2" pos="5760">
+          <p15:clr>
+            <a:srgbClr val="A4A3A4"/>
+          </p15:clr>
+        </p15:guide>
+      </p15:sldGuideLst>
+    </p:ext>
+  </p:extLst>
 </p:presentation>
 </file>
 
@@ -192,7 +208,7 @@
           <a:p>
             <a:fld id="{8F2FD15C-CBA0-4BCE-BE84-26287205EF6C}" type="datetimeFigureOut">
               <a:rPr lang="en-US" smtClean="0"/>
-              <a:t>2/8/2017</a:t>
+              <a:t>4/15/2022</a:t>
             </a:fld>
             <a:endParaRPr lang="en-US"/>
           </a:p>
@@ -256,38 +272,37 @@
           <a:p>
             <a:pPr lvl="0"/>
             <a:r>
-              <a:rPr lang="en-US" smtClean="0"/>
+              <a:rPr lang="en-US"/>
               <a:t>Click to edit Master text styles</a:t>
             </a:r>
           </a:p>
           <a:p>
             <a:pPr lvl="1"/>
             <a:r>
-              <a:rPr lang="en-US" smtClean="0"/>
+              <a:rPr lang="en-US"/>
               <a:t>Second level</a:t>
             </a:r>
           </a:p>
           <a:p>
             <a:pPr lvl="2"/>
             <a:r>
-              <a:rPr lang="en-US" smtClean="0"/>
+              <a:rPr lang="en-US"/>
               <a:t>Third level</a:t>
             </a:r>
           </a:p>
           <a:p>
             <a:pPr lvl="3"/>
             <a:r>
-              <a:rPr lang="en-US" smtClean="0"/>
+              <a:rPr lang="en-US"/>
               <a:t>Fourth level</a:t>
             </a:r>
           </a:p>
           <a:p>
             <a:pPr lvl="4"/>
             <a:r>
-              <a:rPr lang="en-US" smtClean="0"/>
+              <a:rPr lang="en-US"/>
               <a:t>Fifth level</a:t>
             </a:r>
-            <a:endParaRPr lang="en-US"/>
           </a:p>
         </p:txBody>
       </p:sp>
@@ -582,10 +597,9 @@
           <a:lstStyle/>
           <a:p>
             <a:r>
-              <a:rPr lang="en-US" smtClean="0"/>
+              <a:rPr lang="en-US"/>
               <a:t>Click to edit Master title style</a:t>
             </a:r>
-            <a:endParaRPr lang="en-US"/>
           </a:p>
         </p:txBody>
       </p:sp>
@@ -701,10 +715,9 @@
           </a:lstStyle>
           <a:p>
             <a:r>
-              <a:rPr lang="en-US" smtClean="0"/>
+              <a:rPr lang="en-US"/>
               <a:t>Click to edit Master subtitle style</a:t>
             </a:r>
-            <a:endParaRPr lang="en-US"/>
           </a:p>
         </p:txBody>
       </p:sp>
@@ -726,7 +739,7 @@
             <a:fld id="{1D8BD707-D9CF-40AE-B4C6-C98DA3205C09}" type="datetimeFigureOut">
               <a:rPr lang="en-US" smtClean="0"/>
               <a:pPr/>
-              <a:t>2/8/2017</a:t>
+              <a:t>4/15/2022</a:t>
             </a:fld>
             <a:endParaRPr lang="en-US"/>
           </a:p>
@@ -816,10 +829,9 @@
           <a:lstStyle/>
           <a:p>
             <a:r>
-              <a:rPr lang="en-US" smtClean="0"/>
+              <a:rPr lang="en-US"/>
               <a:t>Click to edit Master title style</a:t>
             </a:r>
-            <a:endParaRPr lang="en-US"/>
           </a:p>
         </p:txBody>
       </p:sp>
@@ -840,38 +852,37 @@
           <a:p>
             <a:pPr lvl="0"/>
             <a:r>
-              <a:rPr lang="en-US" smtClean="0"/>
+              <a:rPr lang="en-US"/>
               <a:t>Click to edit Master text styles</a:t>
             </a:r>
           </a:p>
           <a:p>
             <a:pPr lvl="1"/>
             <a:r>
-              <a:rPr lang="en-US" smtClean="0"/>
+              <a:rPr lang="en-US"/>
               <a:t>Second level</a:t>
             </a:r>
           </a:p>
           <a:p>
             <a:pPr lvl="2"/>
             <a:r>
-              <a:rPr lang="en-US" smtClean="0"/>
+              <a:rPr lang="en-US"/>
               <a:t>Third level</a:t>
             </a:r>
           </a:p>
           <a:p>
             <a:pPr lvl="3"/>
             <a:r>
-              <a:rPr lang="en-US" smtClean="0"/>
+              <a:rPr lang="en-US"/>
               <a:t>Fourth level</a:t>
             </a:r>
           </a:p>
           <a:p>
             <a:pPr lvl="4"/>
             <a:r>
-              <a:rPr lang="en-US" smtClean="0"/>
+              <a:rPr lang="en-US"/>
               <a:t>Fifth level</a:t>
             </a:r>
-            <a:endParaRPr lang="en-US"/>
           </a:p>
         </p:txBody>
       </p:sp>
@@ -893,7 +904,7 @@
             <a:fld id="{1D8BD707-D9CF-40AE-B4C6-C98DA3205C09}" type="datetimeFigureOut">
               <a:rPr lang="en-US" smtClean="0"/>
               <a:pPr/>
-              <a:t>2/8/2017</a:t>
+              <a:t>4/15/2022</a:t>
             </a:fld>
             <a:endParaRPr lang="en-US"/>
           </a:p>
@@ -988,10 +999,9 @@
           <a:lstStyle/>
           <a:p>
             <a:r>
-              <a:rPr lang="en-US" smtClean="0"/>
+              <a:rPr lang="en-US"/>
               <a:t>Click to edit Master title style</a:t>
             </a:r>
-            <a:endParaRPr lang="en-US"/>
           </a:p>
         </p:txBody>
       </p:sp>
@@ -1017,38 +1027,37 @@
           <a:p>
             <a:pPr lvl="0"/>
             <a:r>
-              <a:rPr lang="en-US" smtClean="0"/>
+              <a:rPr lang="en-US"/>
               <a:t>Click to edit Master text styles</a:t>
             </a:r>
           </a:p>
           <a:p>
             <a:pPr lvl="1"/>
             <a:r>
-              <a:rPr lang="en-US" smtClean="0"/>
+              <a:rPr lang="en-US"/>
               <a:t>Second level</a:t>
             </a:r>
           </a:p>
           <a:p>
             <a:pPr lvl="2"/>
             <a:r>
-              <a:rPr lang="en-US" smtClean="0"/>
+              <a:rPr lang="en-US"/>
               <a:t>Third level</a:t>
             </a:r>
           </a:p>
           <a:p>
             <a:pPr lvl="3"/>
             <a:r>
-              <a:rPr lang="en-US" smtClean="0"/>
+              <a:rPr lang="en-US"/>
               <a:t>Fourth level</a:t>
             </a:r>
           </a:p>
           <a:p>
             <a:pPr lvl="4"/>
             <a:r>
-              <a:rPr lang="en-US" smtClean="0"/>
+              <a:rPr lang="en-US"/>
               <a:t>Fifth level</a:t>
             </a:r>
-            <a:endParaRPr lang="en-US"/>
           </a:p>
         </p:txBody>
       </p:sp>
@@ -1070,7 +1079,7 @@
             <a:fld id="{1D8BD707-D9CF-40AE-B4C6-C98DA3205C09}" type="datetimeFigureOut">
               <a:rPr lang="en-US" smtClean="0"/>
               <a:pPr/>
-              <a:t>2/8/2017</a:t>
+              <a:t>4/15/2022</a:t>
             </a:fld>
             <a:endParaRPr lang="en-US"/>
           </a:p>
@@ -1160,10 +1169,9 @@
           <a:lstStyle/>
           <a:p>
             <a:r>
-              <a:rPr lang="en-US" smtClean="0"/>
+              <a:rPr lang="en-US"/>
               <a:t>Click to edit Master title style</a:t>
             </a:r>
-            <a:endParaRPr lang="en-US"/>
           </a:p>
         </p:txBody>
       </p:sp>
@@ -1184,38 +1192,37 @@
           <a:p>
             <a:pPr lvl="0"/>
             <a:r>
-              <a:rPr lang="en-US" smtClean="0"/>
+              <a:rPr lang="en-US"/>
               <a:t>Click to edit Master text styles</a:t>
             </a:r>
           </a:p>
           <a:p>
             <a:pPr lvl="1"/>
             <a:r>
-              <a:rPr lang="en-US" smtClean="0"/>
+              <a:rPr lang="en-US"/>
               <a:t>Second level</a:t>
             </a:r>
           </a:p>
           <a:p>
             <a:pPr lvl="2"/>
             <a:r>
-              <a:rPr lang="en-US" smtClean="0"/>
+              <a:rPr lang="en-US"/>
               <a:t>Third level</a:t>
             </a:r>
           </a:p>
           <a:p>
             <a:pPr lvl="3"/>
             <a:r>
-              <a:rPr lang="en-US" smtClean="0"/>
+              <a:rPr lang="en-US"/>
               <a:t>Fourth level</a:t>
             </a:r>
           </a:p>
           <a:p>
             <a:pPr lvl="4"/>
             <a:r>
-              <a:rPr lang="en-US" smtClean="0"/>
+              <a:rPr lang="en-US"/>
               <a:t>Fifth level</a:t>
             </a:r>
-            <a:endParaRPr lang="en-US"/>
           </a:p>
         </p:txBody>
       </p:sp>
@@ -1237,7 +1244,7 @@
             <a:fld id="{1D8BD707-D9CF-40AE-B4C6-C98DA3205C09}" type="datetimeFigureOut">
               <a:rPr lang="en-US" smtClean="0"/>
               <a:pPr/>
-              <a:t>2/8/2017</a:t>
+              <a:t>4/15/2022</a:t>
             </a:fld>
             <a:endParaRPr lang="en-US"/>
           </a:p>
@@ -1336,10 +1343,9 @@
           </a:lstStyle>
           <a:p>
             <a:r>
-              <a:rPr lang="en-US" smtClean="0"/>
+              <a:rPr lang="en-US"/>
               <a:t>Click to edit Master title style</a:t>
             </a:r>
-            <a:endParaRPr lang="en-US"/>
           </a:p>
         </p:txBody>
       </p:sp>
@@ -1456,7 +1462,7 @@
           <a:p>
             <a:pPr lvl="0"/>
             <a:r>
-              <a:rPr lang="en-US" smtClean="0"/>
+              <a:rPr lang="en-US"/>
               <a:t>Click to edit Master text styles</a:t>
             </a:r>
           </a:p>
@@ -1480,7 +1486,7 @@
             <a:fld id="{1D8BD707-D9CF-40AE-B4C6-C98DA3205C09}" type="datetimeFigureOut">
               <a:rPr lang="en-US" smtClean="0"/>
               <a:pPr/>
-              <a:t>2/8/2017</a:t>
+              <a:t>4/15/2022</a:t>
             </a:fld>
             <a:endParaRPr lang="en-US"/>
           </a:p>
@@ -1570,10 +1576,9 @@
           <a:lstStyle/>
           <a:p>
             <a:r>
-              <a:rPr lang="en-US" smtClean="0"/>
+              <a:rPr lang="en-US"/>
               <a:t>Click to edit Master title style</a:t>
             </a:r>
-            <a:endParaRPr lang="en-US"/>
           </a:p>
         </p:txBody>
       </p:sp>
@@ -1627,38 +1632,37 @@
           <a:p>
             <a:pPr lvl="0"/>
             <a:r>
-              <a:rPr lang="en-US" smtClean="0"/>
+              <a:rPr lang="en-US"/>
               <a:t>Click to edit Master text styles</a:t>
             </a:r>
           </a:p>
           <a:p>
             <a:pPr lvl="1"/>
             <a:r>
-              <a:rPr lang="en-US" smtClean="0"/>
+              <a:rPr lang="en-US"/>
               <a:t>Second level</a:t>
             </a:r>
           </a:p>
           <a:p>
             <a:pPr lvl="2"/>
             <a:r>
-              <a:rPr lang="en-US" smtClean="0"/>
+              <a:rPr lang="en-US"/>
               <a:t>Third level</a:t>
             </a:r>
           </a:p>
           <a:p>
             <a:pPr lvl="3"/>
             <a:r>
-              <a:rPr lang="en-US" smtClean="0"/>
+              <a:rPr lang="en-US"/>
               <a:t>Fourth level</a:t>
             </a:r>
           </a:p>
           <a:p>
             <a:pPr lvl="4"/>
             <a:r>
-              <a:rPr lang="en-US" smtClean="0"/>
+              <a:rPr lang="en-US"/>
               <a:t>Fifth level</a:t>
             </a:r>
-            <a:endParaRPr lang="en-US"/>
           </a:p>
         </p:txBody>
       </p:sp>
@@ -1712,38 +1716,37 @@
           <a:p>
             <a:pPr lvl="0"/>
             <a:r>
-              <a:rPr lang="en-US" smtClean="0"/>
+              <a:rPr lang="en-US"/>
               <a:t>Click to edit Master text styles</a:t>
             </a:r>
           </a:p>
           <a:p>
             <a:pPr lvl="1"/>
             <a:r>
-              <a:rPr lang="en-US" smtClean="0"/>
+              <a:rPr lang="en-US"/>
               <a:t>Second level</a:t>
             </a:r>
           </a:p>
           <a:p>
             <a:pPr lvl="2"/>
             <a:r>
-              <a:rPr lang="en-US" smtClean="0"/>
+              <a:rPr lang="en-US"/>
               <a:t>Third level</a:t>
             </a:r>
           </a:p>
           <a:p>
             <a:pPr lvl="3"/>
             <a:r>
-              <a:rPr lang="en-US" smtClean="0"/>
+              <a:rPr lang="en-US"/>
               <a:t>Fourth level</a:t>
             </a:r>
           </a:p>
           <a:p>
             <a:pPr lvl="4"/>
             <a:r>
-              <a:rPr lang="en-US" smtClean="0"/>
+              <a:rPr lang="en-US"/>
               <a:t>Fifth level</a:t>
             </a:r>
-            <a:endParaRPr lang="en-US"/>
           </a:p>
         </p:txBody>
       </p:sp>
@@ -1765,7 +1768,7 @@
             <a:fld id="{1D8BD707-D9CF-40AE-B4C6-C98DA3205C09}" type="datetimeFigureOut">
               <a:rPr lang="en-US" smtClean="0"/>
               <a:pPr/>
-              <a:t>2/8/2017</a:t>
+              <a:t>4/15/2022</a:t>
             </a:fld>
             <a:endParaRPr lang="en-US"/>
           </a:p>
@@ -1859,10 +1862,9 @@
           </a:lstStyle>
           <a:p>
             <a:r>
-              <a:rPr lang="en-US" smtClean="0"/>
+              <a:rPr lang="en-US"/>
               <a:t>Click to edit Master title style</a:t>
             </a:r>
-            <a:endParaRPr lang="en-US"/>
           </a:p>
         </p:txBody>
       </p:sp>
@@ -1925,7 +1927,7 @@
           <a:p>
             <a:pPr lvl="0"/>
             <a:r>
-              <a:rPr lang="en-US" smtClean="0"/>
+              <a:rPr lang="en-US"/>
               <a:t>Click to edit Master text styles</a:t>
             </a:r>
           </a:p>
@@ -1981,38 +1983,37 @@
           <a:p>
             <a:pPr lvl="0"/>
             <a:r>
-              <a:rPr lang="en-US" smtClean="0"/>
+              <a:rPr lang="en-US"/>
               <a:t>Click to edit Master text styles</a:t>
             </a:r>
           </a:p>
           <a:p>
             <a:pPr lvl="1"/>
             <a:r>
-              <a:rPr lang="en-US" smtClean="0"/>
+              <a:rPr lang="en-US"/>
               <a:t>Second level</a:t>
             </a:r>
           </a:p>
           <a:p>
             <a:pPr lvl="2"/>
             <a:r>
-              <a:rPr lang="en-US" smtClean="0"/>
+              <a:rPr lang="en-US"/>
               <a:t>Third level</a:t>
             </a:r>
           </a:p>
           <a:p>
             <a:pPr lvl="3"/>
             <a:r>
-              <a:rPr lang="en-US" smtClean="0"/>
+              <a:rPr lang="en-US"/>
               <a:t>Fourth level</a:t>
             </a:r>
           </a:p>
           <a:p>
             <a:pPr lvl="4"/>
             <a:r>
-              <a:rPr lang="en-US" smtClean="0"/>
+              <a:rPr lang="en-US"/>
               <a:t>Fifth level</a:t>
             </a:r>
-            <a:endParaRPr lang="en-US"/>
           </a:p>
         </p:txBody>
       </p:sp>
@@ -2075,7 +2076,7 @@
           <a:p>
             <a:pPr lvl="0"/>
             <a:r>
-              <a:rPr lang="en-US" smtClean="0"/>
+              <a:rPr lang="en-US"/>
               <a:t>Click to edit Master text styles</a:t>
             </a:r>
           </a:p>
@@ -2131,38 +2132,37 @@
           <a:p>
             <a:pPr lvl="0"/>
             <a:r>
-              <a:rPr lang="en-US" smtClean="0"/>
+              <a:rPr lang="en-US"/>
               <a:t>Click to edit Master text styles</a:t>
             </a:r>
           </a:p>
           <a:p>
             <a:pPr lvl="1"/>
             <a:r>
-              <a:rPr lang="en-US" smtClean="0"/>
+              <a:rPr lang="en-US"/>
               <a:t>Second level</a:t>
             </a:r>
           </a:p>
           <a:p>
             <a:pPr lvl="2"/>
             <a:r>
-              <a:rPr lang="en-US" smtClean="0"/>
+              <a:rPr lang="en-US"/>
               <a:t>Third level</a:t>
             </a:r>
           </a:p>
           <a:p>
             <a:pPr lvl="3"/>
             <a:r>
-              <a:rPr lang="en-US" smtClean="0"/>
+              <a:rPr lang="en-US"/>
               <a:t>Fourth level</a:t>
             </a:r>
           </a:p>
           <a:p>
             <a:pPr lvl="4"/>
             <a:r>
-              <a:rPr lang="en-US" smtClean="0"/>
+              <a:rPr lang="en-US"/>
               <a:t>Fifth level</a:t>
             </a:r>
-            <a:endParaRPr lang="en-US"/>
           </a:p>
         </p:txBody>
       </p:sp>
@@ -2184,7 +2184,7 @@
             <a:fld id="{1D8BD707-D9CF-40AE-B4C6-C98DA3205C09}" type="datetimeFigureOut">
               <a:rPr lang="en-US" smtClean="0"/>
               <a:pPr/>
-              <a:t>2/8/2017</a:t>
+              <a:t>4/15/2022</a:t>
             </a:fld>
             <a:endParaRPr lang="en-US"/>
           </a:p>
@@ -2274,10 +2274,9 @@
           <a:lstStyle/>
           <a:p>
             <a:r>
-              <a:rPr lang="en-US" smtClean="0"/>
+              <a:rPr lang="en-US"/>
               <a:t>Click to edit Master title style</a:t>
             </a:r>
-            <a:endParaRPr lang="en-US"/>
           </a:p>
         </p:txBody>
       </p:sp>
@@ -2299,7 +2298,7 @@
             <a:fld id="{1D8BD707-D9CF-40AE-B4C6-C98DA3205C09}" type="datetimeFigureOut">
               <a:rPr lang="en-US" smtClean="0"/>
               <a:pPr/>
-              <a:t>2/8/2017</a:t>
+              <a:t>4/15/2022</a:t>
             </a:fld>
             <a:endParaRPr lang="en-US"/>
           </a:p>
@@ -2391,7 +2390,7 @@
             <a:fld id="{1D8BD707-D9CF-40AE-B4C6-C98DA3205C09}" type="datetimeFigureOut">
               <a:rPr lang="en-US" smtClean="0"/>
               <a:pPr/>
-              <a:t>2/8/2017</a:t>
+              <a:t>4/15/2022</a:t>
             </a:fld>
             <a:endParaRPr lang="en-US"/>
           </a:p>
@@ -2490,10 +2489,9 @@
           </a:lstStyle>
           <a:p>
             <a:r>
-              <a:rPr lang="en-US" smtClean="0"/>
+              <a:rPr lang="en-US"/>
               <a:t>Click to edit Master title style</a:t>
             </a:r>
-            <a:endParaRPr lang="en-US"/>
           </a:p>
         </p:txBody>
       </p:sp>
@@ -2547,38 +2545,37 @@
           <a:p>
             <a:pPr lvl="0"/>
             <a:r>
-              <a:rPr lang="en-US" smtClean="0"/>
+              <a:rPr lang="en-US"/>
               <a:t>Click to edit Master text styles</a:t>
             </a:r>
           </a:p>
           <a:p>
             <a:pPr lvl="1"/>
             <a:r>
-              <a:rPr lang="en-US" smtClean="0"/>
+              <a:rPr lang="en-US"/>
               <a:t>Second level</a:t>
             </a:r>
           </a:p>
           <a:p>
             <a:pPr lvl="2"/>
             <a:r>
-              <a:rPr lang="en-US" smtClean="0"/>
+              <a:rPr lang="en-US"/>
               <a:t>Third level</a:t>
             </a:r>
           </a:p>
           <a:p>
             <a:pPr lvl="3"/>
             <a:r>
-              <a:rPr lang="en-US" smtClean="0"/>
+              <a:rPr lang="en-US"/>
               <a:t>Fourth level</a:t>
             </a:r>
           </a:p>
           <a:p>
             <a:pPr lvl="4"/>
             <a:r>
-              <a:rPr lang="en-US" smtClean="0"/>
+              <a:rPr lang="en-US"/>
               <a:t>Fifth level</a:t>
             </a:r>
-            <a:endParaRPr lang="en-US"/>
           </a:p>
         </p:txBody>
       </p:sp>
@@ -2641,7 +2638,7 @@
           <a:p>
             <a:pPr lvl="0"/>
             <a:r>
-              <a:rPr lang="en-US" smtClean="0"/>
+              <a:rPr lang="en-US"/>
               <a:t>Click to edit Master text styles</a:t>
             </a:r>
           </a:p>
@@ -2665,7 +2662,7 @@
             <a:fld id="{1D8BD707-D9CF-40AE-B4C6-C98DA3205C09}" type="datetimeFigureOut">
               <a:rPr lang="en-US" smtClean="0"/>
               <a:pPr/>
-              <a:t>2/8/2017</a:t>
+              <a:t>4/15/2022</a:t>
             </a:fld>
             <a:endParaRPr lang="en-US"/>
           </a:p>
@@ -2764,10 +2761,9 @@
           </a:lstStyle>
           <a:p>
             <a:r>
-              <a:rPr lang="en-US" smtClean="0"/>
+              <a:rPr lang="en-US"/>
               <a:t>Click to edit Master title style</a:t>
             </a:r>
-            <a:endParaRPr lang="en-US"/>
           </a:p>
         </p:txBody>
       </p:sp>
@@ -2891,7 +2887,7 @@
           <a:p>
             <a:pPr lvl="0"/>
             <a:r>
-              <a:rPr lang="en-US" smtClean="0"/>
+              <a:rPr lang="en-US"/>
               <a:t>Click to edit Master text styles</a:t>
             </a:r>
           </a:p>
@@ -2915,7 +2911,7 @@
             <a:fld id="{1D8BD707-D9CF-40AE-B4C6-C98DA3205C09}" type="datetimeFigureOut">
               <a:rPr lang="en-US" smtClean="0"/>
               <a:pPr/>
-              <a:t>2/8/2017</a:t>
+              <a:t>4/15/2022</a:t>
             </a:fld>
             <a:endParaRPr lang="en-US"/>
           </a:p>
@@ -3020,10 +3016,9 @@
           <a:lstStyle/>
           <a:p>
             <a:r>
-              <a:rPr lang="en-US" smtClean="0"/>
+              <a:rPr lang="en-US"/>
               <a:t>Click to edit Master title style</a:t>
             </a:r>
-            <a:endParaRPr lang="en-US"/>
           </a:p>
         </p:txBody>
       </p:sp>
@@ -3054,38 +3049,37 @@
           <a:p>
             <a:pPr lvl="0"/>
             <a:r>
-              <a:rPr lang="en-US" smtClean="0"/>
+              <a:rPr lang="en-US"/>
               <a:t>Click to edit Master text styles</a:t>
             </a:r>
           </a:p>
           <a:p>
             <a:pPr lvl="1"/>
             <a:r>
-              <a:rPr lang="en-US" smtClean="0"/>
+              <a:rPr lang="en-US"/>
               <a:t>Second level</a:t>
             </a:r>
           </a:p>
           <a:p>
             <a:pPr lvl="2"/>
             <a:r>
-              <a:rPr lang="en-US" smtClean="0"/>
+              <a:rPr lang="en-US"/>
               <a:t>Third level</a:t>
             </a:r>
           </a:p>
           <a:p>
             <a:pPr lvl="3"/>
             <a:r>
-              <a:rPr lang="en-US" smtClean="0"/>
+              <a:rPr lang="en-US"/>
               <a:t>Fourth level</a:t>
             </a:r>
           </a:p>
           <a:p>
             <a:pPr lvl="4"/>
             <a:r>
-              <a:rPr lang="en-US" smtClean="0"/>
+              <a:rPr lang="en-US"/>
               <a:t>Fifth level</a:t>
             </a:r>
-            <a:endParaRPr lang="en-US"/>
           </a:p>
         </p:txBody>
       </p:sp>
@@ -3125,7 +3119,7 @@
             <a:fld id="{1D8BD707-D9CF-40AE-B4C6-C98DA3205C09}" type="datetimeFigureOut">
               <a:rPr lang="en-US" smtClean="0"/>
               <a:pPr/>
-              <a:t>2/8/2017</a:t>
+              <a:t>4/15/2022</a:t>
             </a:fld>
             <a:endParaRPr lang="en-US"/>
           </a:p>
@@ -3568,10 +3562,9 @@
           <a:p>
             <a:pPr algn="ctr"/>
             <a:r>
-              <a:rPr lang="en-US" sz="2400" b="1" dirty="0" smtClean="0"/>
+              <a:rPr lang="en-US" sz="2400" b="1" dirty="0"/>
               <a:t>Lab1</a:t>
             </a:r>
-            <a:endParaRPr lang="en-US" sz="2400" b="1" dirty="0"/>
           </a:p>
         </p:txBody>
       </p:sp>
@@ -3647,7 +3640,7 @@
           <a:p>
             <a:pPr algn="ctr"/>
             <a:r>
-              <a:rPr lang="en-US" sz="1800" b="1" dirty="0" smtClean="0"/>
+              <a:rPr lang="en-US" sz="1800" b="1" dirty="0"/>
               <a:t>Process</a:t>
             </a:r>
             <a:endParaRPr lang="en-US" sz="4400" b="1" dirty="0"/>
@@ -3717,7 +3710,7 @@
           <a:p>
             <a:pPr algn="r"/>
             <a:r>
-              <a:rPr lang="en-US" sz="1800" dirty="0" err="1" smtClean="0"/>
+              <a:rPr lang="en-US" sz="1800" dirty="0" err="1"/>
               <a:t>clk</a:t>
             </a:r>
             <a:endParaRPr lang="en-US" sz="1800" dirty="0"/>
@@ -3857,7 +3850,7 @@
           <a:p>
             <a:pPr algn="r"/>
             <a:r>
-              <a:rPr lang="en-US" sz="1800" dirty="0" err="1" smtClean="0"/>
+              <a:rPr lang="en-US" sz="1800" dirty="0" err="1"/>
               <a:t>btn</a:t>
             </a:r>
             <a:endParaRPr lang="en-US" sz="1800" dirty="0"/>
@@ -3923,7 +3916,7 @@
           <a:lstStyle/>
           <a:p>
             <a:r>
-              <a:rPr lang="en-US" sz="1800" dirty="0" err="1" smtClean="0"/>
+              <a:rPr lang="en-US" sz="1800" dirty="0" err="1"/>
               <a:t>tr_volt</a:t>
             </a:r>
             <a:endParaRPr lang="en-US" sz="1800" dirty="0"/>
@@ -4050,10 +4043,9 @@
           <a:p>
             <a:pPr algn="ctr"/>
             <a:r>
-              <a:rPr lang="en-US" sz="2400" b="1" dirty="0" smtClean="0"/>
+              <a:rPr lang="en-US" sz="2400" b="1" dirty="0"/>
               <a:t>Video</a:t>
             </a:r>
-            <a:endParaRPr lang="en-US" sz="2400" b="1" dirty="0"/>
           </a:p>
         </p:txBody>
       </p:sp>
@@ -4081,10 +4073,9 @@
           <a:p>
             <a:pPr algn="ctr"/>
             <a:r>
-              <a:rPr lang="en-US" sz="2400" b="1" dirty="0" smtClean="0"/>
+              <a:rPr lang="en-US" sz="2400" b="1" dirty="0"/>
               <a:t>VGA</a:t>
             </a:r>
-            <a:endParaRPr lang="en-US" sz="2400" b="1" dirty="0"/>
           </a:p>
         </p:txBody>
       </p:sp>
@@ -4160,7 +4151,7 @@
           <a:p>
             <a:pPr algn="ctr"/>
             <a:r>
-              <a:rPr lang="en-US" sz="1800" b="1" dirty="0" smtClean="0"/>
+              <a:rPr lang="en-US" sz="1800" b="1" dirty="0"/>
               <a:t>Clock_Wiz_0</a:t>
             </a:r>
             <a:endParaRPr lang="en-US" sz="4400" b="1" dirty="0"/>
@@ -4190,7 +4181,7 @@
           <a:lstStyle/>
           <a:p>
             <a:r>
-              <a:rPr lang="en-US" sz="1800" dirty="0" err="1" smtClean="0"/>
+              <a:rPr lang="en-US" sz="1800" dirty="0" err="1"/>
               <a:t>clk</a:t>
             </a:r>
             <a:endParaRPr lang="en-US" sz="1800" dirty="0"/>
@@ -4250,7 +4241,7 @@
           <a:lstStyle/>
           <a:p>
             <a:r>
-              <a:rPr lang="en-US" sz="1800" dirty="0" err="1" smtClean="0"/>
+              <a:rPr lang="en-US" sz="1800" dirty="0" err="1"/>
               <a:t>btn</a:t>
             </a:r>
             <a:endParaRPr lang="en-US" sz="1800" dirty="0"/>
@@ -4329,7 +4320,7 @@
           <a:p>
             <a:pPr algn="ctr"/>
             <a:r>
-              <a:rPr lang="en-US" sz="1800" b="1" dirty="0" smtClean="0"/>
+              <a:rPr lang="en-US" sz="1800" b="1" dirty="0"/>
               <a:t>Process</a:t>
             </a:r>
             <a:endParaRPr lang="en-US" sz="4400" b="1" dirty="0"/>
@@ -4399,7 +4390,7 @@
           <a:p>
             <a:pPr algn="r"/>
             <a:r>
-              <a:rPr lang="en-US" sz="1800" dirty="0" err="1" smtClean="0"/>
+              <a:rPr lang="en-US" sz="1800" dirty="0" err="1"/>
               <a:t>clk</a:t>
             </a:r>
             <a:endParaRPr lang="en-US" sz="1800" dirty="0"/>
@@ -4538,7 +4529,7 @@
           <a:p>
             <a:pPr algn="r"/>
             <a:r>
-              <a:rPr lang="en-US" sz="1800" dirty="0" err="1" smtClean="0"/>
+              <a:rPr lang="en-US" sz="1800" dirty="0" err="1"/>
               <a:t>btn</a:t>
             </a:r>
             <a:endParaRPr lang="en-US" sz="1800" dirty="0"/>
@@ -4568,7 +4559,7 @@
           <a:lstStyle/>
           <a:p>
             <a:r>
-              <a:rPr lang="en-US" sz="1800" dirty="0" err="1" smtClean="0"/>
+              <a:rPr lang="en-US" sz="1800" dirty="0" err="1"/>
               <a:t>clk</a:t>
             </a:r>
             <a:endParaRPr lang="en-US" sz="1800" dirty="0"/>
@@ -4628,7 +4619,7 @@
           <a:lstStyle/>
           <a:p>
             <a:r>
-              <a:rPr lang="en-US" sz="1800" dirty="0" err="1" smtClean="0"/>
+              <a:rPr lang="en-US" sz="1800" dirty="0" err="1"/>
               <a:t>btn</a:t>
             </a:r>
             <a:endParaRPr lang="en-US" sz="1800" dirty="0"/>
@@ -4694,7 +4685,7 @@
           <a:lstStyle/>
           <a:p>
             <a:r>
-              <a:rPr lang="en-US" sz="1800" dirty="0" err="1" smtClean="0"/>
+              <a:rPr lang="en-US" sz="1800" dirty="0" err="1"/>
               <a:t>tr_time</a:t>
             </a:r>
             <a:endParaRPr lang="en-US" sz="1800" dirty="0"/>
@@ -4764,7 +4755,7 @@
           <a:p>
             <a:pPr algn="r"/>
             <a:r>
-              <a:rPr lang="en-US" sz="1800" dirty="0" err="1" smtClean="0"/>
+              <a:rPr lang="en-US" sz="1800" dirty="0" err="1"/>
               <a:t>clk</a:t>
             </a:r>
             <a:endParaRPr lang="en-US" sz="1800" dirty="0"/>
@@ -4834,7 +4825,7 @@
           <a:p>
             <a:pPr algn="r"/>
             <a:r>
-              <a:rPr lang="en-US" sz="1800" dirty="0" err="1" smtClean="0"/>
+              <a:rPr lang="en-US" sz="1800" dirty="0" err="1"/>
               <a:t>reset_n</a:t>
             </a:r>
             <a:endParaRPr lang="en-US" sz="1800" dirty="0"/>
@@ -4864,7 +4855,7 @@
           <a:lstStyle/>
           <a:p>
             <a:r>
-              <a:rPr lang="en-US" sz="1800" dirty="0" err="1" smtClean="0"/>
+              <a:rPr lang="en-US" sz="1800" dirty="0" err="1"/>
               <a:t>clk</a:t>
             </a:r>
             <a:endParaRPr lang="en-US" sz="1800" dirty="0"/>
@@ -4894,7 +4885,7 @@
           <a:lstStyle/>
           <a:p>
             <a:r>
-              <a:rPr lang="en-US" sz="1800" dirty="0" err="1" smtClean="0"/>
+              <a:rPr lang="en-US" sz="1800" dirty="0" err="1"/>
               <a:t>resetn</a:t>
             </a:r>
             <a:endParaRPr lang="en-US" sz="1800" dirty="0"/>
@@ -4964,10 +4955,9 @@
           <a:p>
             <a:pPr algn="r"/>
             <a:r>
-              <a:rPr lang="en-US" sz="1800" dirty="0" smtClean="0"/>
+              <a:rPr lang="en-US" sz="1800" dirty="0"/>
               <a:t>clk_out1</a:t>
             </a:r>
-            <a:endParaRPr lang="en-US" sz="1800" dirty="0"/>
           </a:p>
         </p:txBody>
       </p:sp>
@@ -5032,10 +5022,9 @@
           <a:p>
             <a:pPr algn="r"/>
             <a:r>
-              <a:rPr lang="en-US" sz="1800" dirty="0" smtClean="0"/>
+              <a:rPr lang="en-US" sz="1800" dirty="0"/>
               <a:t>clk_out2</a:t>
             </a:r>
-            <a:endParaRPr lang="en-US" sz="1800" dirty="0"/>
           </a:p>
         </p:txBody>
       </p:sp>
@@ -5100,10 +5089,9 @@
           <a:p>
             <a:pPr algn="r"/>
             <a:r>
-              <a:rPr lang="en-US" sz="1800" dirty="0" smtClean="0"/>
+              <a:rPr lang="en-US" sz="1800" dirty="0"/>
               <a:t>clk_out3</a:t>
             </a:r>
-            <a:endParaRPr lang="en-US" sz="1800" dirty="0"/>
           </a:p>
         </p:txBody>
       </p:sp>
@@ -5190,7 +5178,7 @@
           <a:lstStyle/>
           <a:p>
             <a:r>
-              <a:rPr lang="en-US" sz="1800" dirty="0" err="1" smtClean="0"/>
+              <a:rPr lang="en-US" sz="1800" dirty="0" err="1"/>
               <a:t>serialize_clk_n</a:t>
             </a:r>
             <a:endParaRPr lang="en-US" sz="1800" dirty="0"/>
@@ -5269,7 +5257,7 @@
           <a:p>
             <a:pPr algn="ctr"/>
             <a:r>
-              <a:rPr lang="en-US" sz="1800" b="1" dirty="0" err="1" smtClean="0"/>
+              <a:rPr lang="en-US" sz="1800" b="1" dirty="0" err="1"/>
               <a:t>Scopeface</a:t>
             </a:r>
             <a:endParaRPr lang="en-US" sz="4400" b="1" dirty="0"/>
@@ -5339,7 +5327,7 @@
           <a:p>
             <a:pPr algn="r"/>
             <a:r>
-              <a:rPr lang="en-US" sz="1800" dirty="0" err="1" smtClean="0"/>
+              <a:rPr lang="en-US" sz="1800" dirty="0" err="1"/>
               <a:t>tr_volt</a:t>
             </a:r>
             <a:endParaRPr lang="en-US" sz="1800" dirty="0"/>
@@ -5409,7 +5397,7 @@
           <a:p>
             <a:pPr algn="r"/>
             <a:r>
-              <a:rPr lang="en-US" sz="1800" dirty="0" err="1" smtClean="0"/>
+              <a:rPr lang="en-US" sz="1800" dirty="0" err="1"/>
               <a:t>tr_time</a:t>
             </a:r>
             <a:endParaRPr lang="en-US" sz="1800" dirty="0"/>
@@ -5479,10 +5467,9 @@
           <a:p>
             <a:pPr algn="r"/>
             <a:r>
-              <a:rPr lang="en-US" sz="1800" dirty="0" smtClean="0"/>
+              <a:rPr lang="en-US" sz="1800" dirty="0"/>
               <a:t>row</a:t>
             </a:r>
-            <a:endParaRPr lang="en-US" sz="1800" dirty="0"/>
           </a:p>
         </p:txBody>
       </p:sp>
@@ -5509,7 +5496,7 @@
           <a:lstStyle/>
           <a:p>
             <a:r>
-              <a:rPr lang="en-US" sz="1800" dirty="0" err="1" smtClean="0"/>
+              <a:rPr lang="en-US" sz="1800" dirty="0" err="1"/>
               <a:t>tr_volt</a:t>
             </a:r>
             <a:endParaRPr lang="en-US" sz="1800" dirty="0"/>
@@ -5540,11 +5527,7 @@
           <a:p>
             <a:r>
               <a:rPr lang="en-US" sz="1800" dirty="0" err="1"/>
-              <a:t>t</a:t>
-            </a:r>
-            <a:r>
-              <a:rPr lang="en-US" sz="1800" dirty="0" err="1" smtClean="0"/>
-              <a:t>r_time</a:t>
+              <a:t>tr_time</a:t>
             </a:r>
             <a:endParaRPr lang="en-US" sz="1800" dirty="0"/>
           </a:p>
@@ -5573,10 +5556,9 @@
           <a:lstStyle/>
           <a:p>
             <a:r>
-              <a:rPr lang="en-US" sz="1800" dirty="0" smtClean="0"/>
+              <a:rPr lang="en-US" sz="1800" dirty="0"/>
               <a:t>row</a:t>
             </a:r>
-            <a:endParaRPr lang="en-US" sz="1800" dirty="0"/>
           </a:p>
         </p:txBody>
       </p:sp>
@@ -5643,10 +5625,9 @@
           <a:p>
             <a:pPr algn="r"/>
             <a:r>
-              <a:rPr lang="en-US" sz="1800" dirty="0" smtClean="0"/>
+              <a:rPr lang="en-US" sz="1800" dirty="0"/>
               <a:t>column</a:t>
             </a:r>
-            <a:endParaRPr lang="en-US" sz="1800" dirty="0"/>
           </a:p>
         </p:txBody>
       </p:sp>
@@ -5673,10 +5654,9 @@
           <a:lstStyle/>
           <a:p>
             <a:r>
-              <a:rPr lang="en-US" sz="1800" dirty="0" smtClean="0"/>
+              <a:rPr lang="en-US" sz="1800" dirty="0"/>
               <a:t>column</a:t>
             </a:r>
-            <a:endParaRPr lang="en-US" sz="1800" dirty="0"/>
           </a:p>
         </p:txBody>
       </p:sp>
@@ -5740,12 +5720,8 @@
           <a:p>
             <a:pPr algn="r"/>
             <a:r>
-              <a:rPr lang="en-US" sz="1800" dirty="0" smtClean="0"/>
-              <a:t>ch</a:t>
-            </a:r>
-            <a:r>
               <a:rPr lang="en-US" sz="1800" dirty="0"/>
-              <a:t>1</a:t>
+              <a:t>ch1</a:t>
             </a:r>
           </a:p>
         </p:txBody>
@@ -5813,10 +5789,9 @@
           <a:p>
             <a:pPr algn="r"/>
             <a:r>
-              <a:rPr lang="en-US" sz="1800" dirty="0" smtClean="0"/>
+              <a:rPr lang="en-US" sz="1800" dirty="0"/>
               <a:t>ch1_enb</a:t>
             </a:r>
-            <a:endParaRPr lang="en-US" sz="1800" dirty="0"/>
           </a:p>
         </p:txBody>
       </p:sp>
@@ -5843,10 +5818,9 @@
           <a:lstStyle/>
           <a:p>
             <a:r>
-              <a:rPr lang="en-US" sz="1800" dirty="0" smtClean="0"/>
+              <a:rPr lang="en-US" sz="1800" dirty="0"/>
               <a:t>ch1</a:t>
             </a:r>
-            <a:endParaRPr lang="en-US" sz="1800" dirty="0"/>
           </a:p>
         </p:txBody>
       </p:sp>
@@ -5873,10 +5847,9 @@
           <a:lstStyle/>
           <a:p>
             <a:r>
-              <a:rPr lang="en-US" sz="1800" dirty="0" smtClean="0"/>
+              <a:rPr lang="en-US" sz="1800" dirty="0"/>
               <a:t>ch1_enb</a:t>
             </a:r>
-            <a:endParaRPr lang="en-US" sz="1800" dirty="0"/>
           </a:p>
         </p:txBody>
       </p:sp>
@@ -5940,10 +5913,9 @@
           <a:p>
             <a:pPr algn="r"/>
             <a:r>
-              <a:rPr lang="en-US" sz="1800" dirty="0" smtClean="0"/>
+              <a:rPr lang="en-US" sz="1800" dirty="0"/>
               <a:t>ch2</a:t>
             </a:r>
-            <a:endParaRPr lang="en-US" sz="1800" dirty="0"/>
           </a:p>
         </p:txBody>
       </p:sp>
@@ -6010,10 +5982,9 @@
           <a:p>
             <a:pPr algn="r"/>
             <a:r>
-              <a:rPr lang="en-US" sz="1800" dirty="0" smtClean="0"/>
+              <a:rPr lang="en-US" sz="1800" dirty="0"/>
               <a:t>ch2_enb</a:t>
             </a:r>
-            <a:endParaRPr lang="en-US" sz="1800" dirty="0"/>
           </a:p>
         </p:txBody>
       </p:sp>
@@ -6040,10 +6011,9 @@
           <a:lstStyle/>
           <a:p>
             <a:r>
-              <a:rPr lang="en-US" sz="1800" dirty="0" smtClean="0"/>
+              <a:rPr lang="en-US" sz="1800" dirty="0"/>
               <a:t>ch2</a:t>
             </a:r>
-            <a:endParaRPr lang="en-US" sz="1800" dirty="0"/>
           </a:p>
         </p:txBody>
       </p:sp>
@@ -6070,10 +6040,9 @@
           <a:lstStyle/>
           <a:p>
             <a:r>
-              <a:rPr lang="en-US" sz="1800" dirty="0" smtClean="0"/>
+              <a:rPr lang="en-US" sz="1800" dirty="0"/>
               <a:t>ch2_enb</a:t>
             </a:r>
-            <a:endParaRPr lang="en-US" sz="1800" dirty="0"/>
           </a:p>
         </p:txBody>
       </p:sp>
@@ -6139,10 +6108,9 @@
           <a:p>
             <a:pPr algn="r"/>
             <a:r>
-              <a:rPr lang="en-US" sz="1800" dirty="0" smtClean="0"/>
+              <a:rPr lang="en-US" sz="1800" dirty="0"/>
               <a:t>R</a:t>
             </a:r>
-            <a:endParaRPr lang="en-US" sz="1800" dirty="0"/>
           </a:p>
         </p:txBody>
       </p:sp>
@@ -6208,10 +6176,9 @@
           <a:p>
             <a:pPr algn="r"/>
             <a:r>
-              <a:rPr lang="en-US" sz="1800" dirty="0" smtClean="0"/>
+              <a:rPr lang="en-US" sz="1800" dirty="0"/>
               <a:t>G</a:t>
             </a:r>
-            <a:endParaRPr lang="en-US" sz="1800" dirty="0"/>
           </a:p>
         </p:txBody>
       </p:sp>
@@ -6277,10 +6244,9 @@
           <a:p>
             <a:pPr algn="r"/>
             <a:r>
-              <a:rPr lang="en-US" sz="1800" dirty="0" smtClean="0"/>
+              <a:rPr lang="en-US" sz="1800" dirty="0"/>
               <a:t>B</a:t>
             </a:r>
-            <a:endParaRPr lang="en-US" sz="1800" dirty="0"/>
           </a:p>
         </p:txBody>
       </p:sp>
@@ -6347,10 +6313,9 @@
           <a:p>
             <a:pPr algn="r"/>
             <a:r>
-              <a:rPr lang="en-US" sz="1800" dirty="0" smtClean="0"/>
+              <a:rPr lang="en-US" sz="1800" dirty="0"/>
               <a:t>blank</a:t>
             </a:r>
-            <a:endParaRPr lang="en-US" sz="1800" dirty="0"/>
           </a:p>
         </p:txBody>
       </p:sp>
@@ -6377,10 +6342,9 @@
           <a:lstStyle/>
           <a:p>
             <a:r>
-              <a:rPr lang="en-US" sz="1800" dirty="0" smtClean="0"/>
+              <a:rPr lang="en-US" sz="1800" dirty="0"/>
               <a:t>blank</a:t>
             </a:r>
-            <a:endParaRPr lang="en-US" sz="1800" dirty="0"/>
           </a:p>
         </p:txBody>
       </p:sp>
@@ -6447,7 +6411,7 @@
           <a:p>
             <a:pPr algn="r"/>
             <a:r>
-              <a:rPr lang="en-US" sz="1800" dirty="0" err="1" smtClean="0"/>
+              <a:rPr lang="en-US" sz="1800" dirty="0" err="1"/>
               <a:t>v_synch</a:t>
             </a:r>
             <a:endParaRPr lang="en-US" sz="1800" dirty="0"/>
@@ -6517,7 +6481,7 @@
           <a:p>
             <a:pPr algn="r"/>
             <a:r>
-              <a:rPr lang="en-US" sz="1800" dirty="0" err="1" smtClean="0"/>
+              <a:rPr lang="en-US" sz="1800" dirty="0" err="1"/>
               <a:t>h_synch</a:t>
             </a:r>
             <a:endParaRPr lang="en-US" sz="1800" dirty="0"/>
@@ -6547,7 +6511,7 @@
           <a:lstStyle/>
           <a:p>
             <a:r>
-              <a:rPr lang="en-US" sz="1800" dirty="0" err="1" smtClean="0"/>
+              <a:rPr lang="en-US" sz="1800" dirty="0" err="1"/>
               <a:t>v_synch</a:t>
             </a:r>
             <a:endParaRPr lang="en-US" sz="1800" dirty="0"/>
@@ -6577,7 +6541,7 @@
           <a:lstStyle/>
           <a:p>
             <a:r>
-              <a:rPr lang="en-US" sz="1800" dirty="0" err="1" smtClean="0"/>
+              <a:rPr lang="en-US" sz="1800" dirty="0" err="1"/>
               <a:t>h_synch</a:t>
             </a:r>
             <a:endParaRPr lang="en-US" sz="1800" dirty="0"/>
@@ -6693,10 +6657,9 @@
           <a:p>
             <a:pPr algn="r"/>
             <a:r>
-              <a:rPr lang="en-US" sz="1800" dirty="0" smtClean="0"/>
+              <a:rPr lang="en-US" sz="1800" dirty="0"/>
               <a:t>R</a:t>
             </a:r>
-            <a:endParaRPr lang="en-US" sz="1800" dirty="0"/>
           </a:p>
         </p:txBody>
       </p:sp>
@@ -6848,10 +6811,9 @@
           <a:p>
             <a:pPr algn="r"/>
             <a:r>
-              <a:rPr lang="en-US" sz="1800" dirty="0" smtClean="0"/>
+              <a:rPr lang="en-US" sz="1800" dirty="0"/>
               <a:t>G</a:t>
             </a:r>
-            <a:endParaRPr lang="en-US" sz="1800" dirty="0"/>
           </a:p>
         </p:txBody>
       </p:sp>
@@ -7003,10 +6965,9 @@
           <a:p>
             <a:pPr algn="r"/>
             <a:r>
-              <a:rPr lang="en-US" sz="1800" dirty="0" smtClean="0"/>
+              <a:rPr lang="en-US" sz="1800" dirty="0"/>
               <a:t>B</a:t>
             </a:r>
-            <a:endParaRPr lang="en-US" sz="1800" dirty="0"/>
           </a:p>
         </p:txBody>
       </p:sp>
@@ -7073,10 +7034,9 @@
           <a:p>
             <a:pPr algn="r"/>
             <a:r>
-              <a:rPr lang="en-US" sz="1800" dirty="0" smtClean="0"/>
+              <a:rPr lang="en-US" sz="1800" dirty="0"/>
               <a:t>R</a:t>
             </a:r>
-            <a:endParaRPr lang="en-US" sz="1800" dirty="0"/>
           </a:p>
         </p:txBody>
       </p:sp>
@@ -7104,10 +7064,9 @@
           <a:p>
             <a:pPr algn="r"/>
             <a:r>
-              <a:rPr lang="en-US" sz="1800" dirty="0" smtClean="0"/>
+              <a:rPr lang="en-US" sz="1800" dirty="0"/>
               <a:t>G</a:t>
             </a:r>
-            <a:endParaRPr lang="en-US" sz="1800" dirty="0"/>
           </a:p>
         </p:txBody>
       </p:sp>
@@ -7135,10 +7094,9 @@
           <a:p>
             <a:pPr algn="r"/>
             <a:r>
-              <a:rPr lang="en-US" sz="1800" dirty="0" smtClean="0"/>
+              <a:rPr lang="en-US" sz="1800" dirty="0"/>
               <a:t>B</a:t>
             </a:r>
-            <a:endParaRPr lang="en-US" sz="1800" dirty="0"/>
           </a:p>
         </p:txBody>
       </p:sp>
@@ -7214,7 +7172,7 @@
           <a:p>
             <a:pPr algn="ctr"/>
             <a:r>
-              <a:rPr lang="en-US" sz="1800" b="1" dirty="0" smtClean="0"/>
+              <a:rPr lang="en-US" sz="1800" b="1" dirty="0"/>
               <a:t>DVID</a:t>
             </a:r>
             <a:endParaRPr lang="en-US" sz="4400" b="1" dirty="0"/>
@@ -7245,10 +7203,9 @@
           <a:p>
             <a:pPr algn="r"/>
             <a:r>
-              <a:rPr lang="en-US" sz="1800" dirty="0" smtClean="0"/>
+              <a:rPr lang="en-US" sz="1800" dirty="0"/>
               <a:t>R</a:t>
             </a:r>
-            <a:endParaRPr lang="en-US" sz="1800" dirty="0"/>
           </a:p>
         </p:txBody>
       </p:sp>
@@ -7276,10 +7233,9 @@
           <a:p>
             <a:pPr algn="r"/>
             <a:r>
-              <a:rPr lang="en-US" sz="1800" dirty="0" smtClean="0"/>
+              <a:rPr lang="en-US" sz="1800" dirty="0"/>
               <a:t>G</a:t>
             </a:r>
-            <a:endParaRPr lang="en-US" sz="1800" dirty="0"/>
           </a:p>
         </p:txBody>
       </p:sp>
@@ -7307,10 +7263,9 @@
           <a:p>
             <a:pPr algn="r"/>
             <a:r>
-              <a:rPr lang="en-US" sz="1800" dirty="0" smtClean="0"/>
+              <a:rPr lang="en-US" sz="1800" dirty="0"/>
               <a:t>B</a:t>
             </a:r>
-            <a:endParaRPr lang="en-US" sz="1800" dirty="0"/>
           </a:p>
         </p:txBody>
       </p:sp>
@@ -8217,10 +8172,9 @@
           <a:p>
             <a:pPr algn="ctr"/>
             <a:r>
-              <a:rPr lang="en-US" sz="1800" dirty="0" smtClean="0"/>
+              <a:rPr lang="en-US" sz="1800" dirty="0"/>
               <a:t>OBUFDS</a:t>
             </a:r>
-            <a:endParaRPr lang="en-US" sz="1800" dirty="0"/>
           </a:p>
         </p:txBody>
       </p:sp>
@@ -8248,10 +8202,9 @@
           <a:p>
             <a:pPr algn="ctr"/>
             <a:r>
-              <a:rPr lang="en-US" sz="1800" dirty="0" smtClean="0"/>
+              <a:rPr lang="en-US" sz="1800" dirty="0"/>
               <a:t>OBUFDS</a:t>
             </a:r>
-            <a:endParaRPr lang="en-US" sz="1800" dirty="0"/>
           </a:p>
         </p:txBody>
       </p:sp>
@@ -8279,10 +8232,9 @@
           <a:p>
             <a:pPr algn="ctr"/>
             <a:r>
-              <a:rPr lang="en-US" sz="1800" dirty="0" smtClean="0"/>
+              <a:rPr lang="en-US" sz="1800" dirty="0"/>
               <a:t>OBUFDS</a:t>
             </a:r>
-            <a:endParaRPr lang="en-US" sz="1800" dirty="0"/>
           </a:p>
         </p:txBody>
       </p:sp>
@@ -8358,7 +8310,7 @@
           <a:p>
             <a:pPr algn="ctr"/>
             <a:r>
-              <a:rPr lang="en-US" sz="1800" b="1" dirty="0" smtClean="0"/>
+              <a:rPr lang="en-US" sz="1800" b="1" dirty="0"/>
               <a:t>counter</a:t>
             </a:r>
             <a:endParaRPr lang="en-US" sz="4400" b="1" dirty="0"/>
@@ -8428,7 +8380,7 @@
           <a:p>
             <a:pPr algn="r"/>
             <a:r>
-              <a:rPr lang="en-US" sz="1800" dirty="0" err="1" smtClean="0"/>
+              <a:rPr lang="en-US" sz="1800" dirty="0" err="1"/>
               <a:t>clk</a:t>
             </a:r>
             <a:endParaRPr lang="en-US" sz="1800" dirty="0"/>
@@ -8498,7 +8450,7 @@
           <a:p>
             <a:pPr algn="r"/>
             <a:r>
-              <a:rPr lang="en-US" sz="1800" dirty="0" err="1" smtClean="0"/>
+              <a:rPr lang="en-US" sz="1800" dirty="0" err="1"/>
               <a:t>reset_n</a:t>
             </a:r>
             <a:endParaRPr lang="en-US" sz="1800" dirty="0"/>
@@ -8528,7 +8480,7 @@
           <a:lstStyle/>
           <a:p>
             <a:r>
-              <a:rPr lang="en-US" sz="1800" dirty="0" err="1" smtClean="0"/>
+              <a:rPr lang="en-US" sz="1800" dirty="0" err="1"/>
               <a:t>clk</a:t>
             </a:r>
             <a:endParaRPr lang="en-US" sz="1800" dirty="0"/>
@@ -8558,7 +8510,7 @@
           <a:lstStyle/>
           <a:p>
             <a:r>
-              <a:rPr lang="en-US" sz="1800" dirty="0" err="1" smtClean="0"/>
+              <a:rPr lang="en-US" sz="1800" dirty="0" err="1"/>
               <a:t>reset_n</a:t>
             </a:r>
             <a:endParaRPr lang="en-US" sz="1800" dirty="0"/>
@@ -8628,10 +8580,9 @@
           <a:p>
             <a:pPr algn="r"/>
             <a:r>
-              <a:rPr lang="en-US" sz="1800" dirty="0" smtClean="0"/>
+              <a:rPr lang="en-US" sz="1800" dirty="0"/>
               <a:t>roll</a:t>
             </a:r>
-            <a:endParaRPr lang="en-US" sz="1800" dirty="0"/>
           </a:p>
         </p:txBody>
       </p:sp>
@@ -8698,10 +8649,9 @@
           <a:p>
             <a:pPr algn="r"/>
             <a:r>
-              <a:rPr lang="en-US" sz="1800" dirty="0" smtClean="0"/>
+              <a:rPr lang="en-US" sz="1800" dirty="0"/>
               <a:t>ctrl</a:t>
             </a:r>
-            <a:endParaRPr lang="en-US" sz="1800" dirty="0"/>
           </a:p>
         </p:txBody>
       </p:sp>
@@ -8728,10 +8678,9 @@
           <a:lstStyle/>
           <a:p>
             <a:r>
-              <a:rPr lang="en-US" sz="1800" dirty="0" smtClean="0"/>
+              <a:rPr lang="en-US" sz="1800" dirty="0"/>
               <a:t>ctrl</a:t>
             </a:r>
-            <a:endParaRPr lang="en-US" sz="1800" dirty="0"/>
           </a:p>
         </p:txBody>
       </p:sp>
@@ -8807,7 +8756,7 @@
           <a:p>
             <a:pPr algn="ctr"/>
             <a:r>
-              <a:rPr lang="en-US" sz="1800" b="1" dirty="0" smtClean="0"/>
+              <a:rPr lang="en-US" sz="1800" b="1" dirty="0"/>
               <a:t>glue</a:t>
             </a:r>
             <a:endParaRPr lang="en-US" sz="4400" b="1" dirty="0"/>
@@ -8886,7 +8835,7 @@
           <a:p>
             <a:pPr algn="ctr"/>
             <a:r>
-              <a:rPr lang="en-US" sz="1800" b="1" dirty="0" smtClean="0"/>
+              <a:rPr lang="en-US" sz="1800" b="1" dirty="0"/>
               <a:t>counter</a:t>
             </a:r>
             <a:endParaRPr lang="en-US" sz="4400" b="1" dirty="0"/>
@@ -8956,7 +8905,7 @@
           <a:p>
             <a:pPr algn="r"/>
             <a:r>
-              <a:rPr lang="en-US" sz="1800" dirty="0" err="1" smtClean="0"/>
+              <a:rPr lang="en-US" sz="1800" dirty="0" err="1"/>
               <a:t>clk</a:t>
             </a:r>
             <a:endParaRPr lang="en-US" sz="1800" dirty="0"/>
@@ -9026,7 +8975,7 @@
           <a:p>
             <a:pPr algn="r"/>
             <a:r>
-              <a:rPr lang="en-US" sz="1800" dirty="0" err="1" smtClean="0"/>
+              <a:rPr lang="en-US" sz="1800" dirty="0" err="1"/>
               <a:t>reset_n</a:t>
             </a:r>
             <a:endParaRPr lang="en-US" sz="1800" dirty="0"/>
@@ -9056,7 +9005,7 @@
           <a:lstStyle/>
           <a:p>
             <a:r>
-              <a:rPr lang="en-US" sz="1800" dirty="0" err="1" smtClean="0"/>
+              <a:rPr lang="en-US" sz="1800" dirty="0" err="1"/>
               <a:t>clk</a:t>
             </a:r>
             <a:endParaRPr lang="en-US" sz="1800" dirty="0"/>
@@ -9156,10 +9105,9 @@
           <a:p>
             <a:pPr algn="r"/>
             <a:r>
-              <a:rPr lang="en-US" sz="1800" dirty="0" smtClean="0"/>
+              <a:rPr lang="en-US" sz="1800" dirty="0"/>
               <a:t>roll</a:t>
             </a:r>
-            <a:endParaRPr lang="en-US" sz="1800" dirty="0"/>
           </a:p>
         </p:txBody>
       </p:sp>
@@ -9224,10 +9172,9 @@
           <a:lstStyle/>
           <a:p>
             <a:r>
-              <a:rPr lang="en-US" sz="1800" dirty="0" smtClean="0"/>
+              <a:rPr lang="en-US" sz="1800" dirty="0"/>
               <a:t>ctrl</a:t>
             </a:r>
-            <a:endParaRPr lang="en-US" sz="1800" dirty="0"/>
           </a:p>
         </p:txBody>
       </p:sp>
@@ -9327,7 +9274,7 @@
           <a:p>
             <a:pPr algn="r"/>
             <a:r>
-              <a:rPr lang="en-US" sz="1800" dirty="0" err="1" smtClean="0"/>
+              <a:rPr lang="en-US" sz="1800" dirty="0" err="1"/>
               <a:t>pixel_clk</a:t>
             </a:r>
             <a:endParaRPr lang="en-US" sz="1800" dirty="0"/>
@@ -9358,7 +9305,7 @@
           <a:p>
             <a:pPr algn="r"/>
             <a:r>
-              <a:rPr lang="en-US" sz="1800" dirty="0" err="1" smtClean="0"/>
+              <a:rPr lang="en-US" sz="1800" dirty="0" err="1"/>
               <a:t>reset_n</a:t>
             </a:r>
             <a:endParaRPr lang="en-US" sz="1800" dirty="0"/>
@@ -9476,7 +9423,7 @@
           <a:p>
             <a:pPr algn="r"/>
             <a:r>
-              <a:rPr lang="en-US" sz="1800" dirty="0" err="1" smtClean="0"/>
+              <a:rPr lang="en-US" sz="1800" dirty="0" err="1"/>
               <a:t>clk</a:t>
             </a:r>
             <a:endParaRPr lang="en-US" sz="1800" dirty="0"/>
@@ -9546,7 +9493,7 @@
           <a:p>
             <a:pPr algn="r"/>
             <a:r>
-              <a:rPr lang="en-US" sz="1800" dirty="0" err="1" smtClean="0"/>
+              <a:rPr lang="en-US" sz="1800" dirty="0" err="1"/>
               <a:t>reset_n</a:t>
             </a:r>
             <a:endParaRPr lang="en-US" sz="1800" dirty="0"/>
@@ -9576,7 +9523,7 @@
           <a:lstStyle/>
           <a:p>
             <a:r>
-              <a:rPr lang="en-US" sz="1800" dirty="0" err="1" smtClean="0"/>
+              <a:rPr lang="en-US" sz="1800" dirty="0" err="1"/>
               <a:t>clk</a:t>
             </a:r>
             <a:endParaRPr lang="en-US" sz="1800" dirty="0"/>
@@ -9606,7 +9553,7 @@
           <a:lstStyle/>
           <a:p>
             <a:r>
-              <a:rPr lang="en-US" sz="1800" dirty="0" err="1" smtClean="0"/>
+              <a:rPr lang="en-US" sz="1800" dirty="0" err="1"/>
               <a:t>reset_n</a:t>
             </a:r>
             <a:endParaRPr lang="en-US" sz="1800" dirty="0"/>
@@ -9675,10 +9622,9 @@
           <a:lstStyle/>
           <a:p>
             <a:r>
-              <a:rPr lang="en-US" sz="1800" dirty="0" smtClean="0"/>
+              <a:rPr lang="en-US" sz="1800" dirty="0"/>
               <a:t>column</a:t>
             </a:r>
-            <a:endParaRPr lang="en-US" sz="1800" dirty="0"/>
           </a:p>
         </p:txBody>
       </p:sp>
@@ -9793,7 +9739,7 @@
           <a:p>
             <a:pPr algn="r"/>
             <a:r>
-              <a:rPr lang="en-US" sz="1800" dirty="0" err="1" smtClean="0"/>
+              <a:rPr lang="en-US" sz="1800" dirty="0" err="1"/>
               <a:t>clk</a:t>
             </a:r>
             <a:endParaRPr lang="en-US" sz="1800" dirty="0"/>
@@ -9893,7 +9839,7 @@
           <a:lstStyle/>
           <a:p>
             <a:r>
-              <a:rPr lang="en-US" sz="1800" dirty="0" err="1" smtClean="0"/>
+              <a:rPr lang="en-US" sz="1800" dirty="0" err="1"/>
               <a:t>clk</a:t>
             </a:r>
             <a:endParaRPr lang="en-US" sz="1800" dirty="0"/>
@@ -9992,10 +9938,9 @@
           <a:lstStyle/>
           <a:p>
             <a:r>
-              <a:rPr lang="en-US" sz="1800" dirty="0" smtClean="0"/>
+              <a:rPr lang="en-US" sz="1800" dirty="0"/>
               <a:t>row</a:t>
             </a:r>
-            <a:endParaRPr lang="en-US" sz="1800" dirty="0"/>
           </a:p>
         </p:txBody>
       </p:sp>
@@ -10094,7 +10039,7 @@
           <a:lstStyle/>
           <a:p>
             <a:r>
-              <a:rPr lang="en-US" sz="1800" dirty="0" err="1" smtClean="0"/>
+              <a:rPr lang="en-US" sz="1800" dirty="0" err="1"/>
               <a:t>h_synch</a:t>
             </a:r>
             <a:endParaRPr lang="en-US" sz="1800" dirty="0"/>
@@ -10124,7 +10069,7 @@
           <a:lstStyle/>
           <a:p>
             <a:r>
-              <a:rPr lang="en-US" sz="1800" dirty="0" err="1" smtClean="0"/>
+              <a:rPr lang="en-US" sz="1800" dirty="0" err="1"/>
               <a:t>h_blank</a:t>
             </a:r>
             <a:endParaRPr lang="en-US" sz="1800" dirty="0"/>
@@ -10226,7 +10171,7 @@
           <a:lstStyle/>
           <a:p>
             <a:r>
-              <a:rPr lang="en-US" sz="1800" dirty="0" err="1" smtClean="0"/>
+              <a:rPr lang="en-US" sz="1800" dirty="0" err="1"/>
               <a:t>v_synch</a:t>
             </a:r>
             <a:endParaRPr lang="en-US" sz="1800" dirty="0"/>
@@ -10256,7 +10201,7 @@
           <a:lstStyle/>
           <a:p>
             <a:r>
-              <a:rPr lang="en-US" sz="1800" dirty="0" err="1" smtClean="0"/>
+              <a:rPr lang="en-US" sz="1800" dirty="0" err="1"/>
               <a:t>v_blank</a:t>
             </a:r>
             <a:endParaRPr lang="en-US" sz="1800" dirty="0"/>
@@ -10286,10 +10231,9 @@
           <a:lstStyle/>
           <a:p>
             <a:r>
-              <a:rPr lang="en-US" sz="1800" dirty="0" smtClean="0"/>
+              <a:rPr lang="en-US" sz="1800" dirty="0"/>
               <a:t>column</a:t>
             </a:r>
-            <a:endParaRPr lang="en-US" sz="1800" dirty="0"/>
           </a:p>
         </p:txBody>
       </p:sp>
@@ -10316,10 +10260,9 @@
           <a:lstStyle/>
           <a:p>
             <a:r>
-              <a:rPr lang="en-US" sz="1800" dirty="0" smtClean="0"/>
+              <a:rPr lang="en-US" sz="1800" dirty="0"/>
               <a:t>row</a:t>
             </a:r>
-            <a:endParaRPr lang="en-US" sz="1800" dirty="0"/>
           </a:p>
         </p:txBody>
       </p:sp>
@@ -10418,10 +10361,9 @@
           <a:lstStyle/>
           <a:p>
             <a:r>
-              <a:rPr lang="en-US" sz="1800" dirty="0" smtClean="0"/>
+              <a:rPr lang="en-US" sz="1800" dirty="0"/>
               <a:t>column</a:t>
             </a:r>
-            <a:endParaRPr lang="en-US" sz="1800" dirty="0"/>
           </a:p>
         </p:txBody>
       </p:sp>
@@ -10448,10 +10390,9 @@
           <a:lstStyle/>
           <a:p>
             <a:r>
-              <a:rPr lang="en-US" sz="1800" dirty="0" smtClean="0"/>
+              <a:rPr lang="en-US" sz="1800" dirty="0"/>
               <a:t>row</a:t>
             </a:r>
-            <a:endParaRPr lang="en-US" sz="1800" dirty="0"/>
           </a:p>
         </p:txBody>
       </p:sp>
@@ -10478,10 +10419,9 @@
           <a:lstStyle/>
           <a:p>
             <a:r>
-              <a:rPr lang="en-US" sz="1800" dirty="0" smtClean="0"/>
+              <a:rPr lang="en-US" sz="1800" dirty="0"/>
               <a:t>column</a:t>
             </a:r>
-            <a:endParaRPr lang="en-US" sz="1800" dirty="0"/>
           </a:p>
         </p:txBody>
       </p:sp>
@@ -10508,10 +10448,9 @@
           <a:lstStyle/>
           <a:p>
             <a:r>
-              <a:rPr lang="en-US" sz="1800" dirty="0" smtClean="0"/>
+              <a:rPr lang="en-US" sz="1800" dirty="0"/>
               <a:t>row</a:t>
             </a:r>
-            <a:endParaRPr lang="en-US" sz="1800" dirty="0"/>
           </a:p>
         </p:txBody>
       </p:sp>
@@ -10555,14 +10494,15 @@
         <p:nvCxnSpPr>
           <p:cNvPr id="270" name="Straight Connector 269"/>
           <p:cNvCxnSpPr>
+            <a:cxnSpLocks/>
             <a:endCxn id="273" idx="1"/>
           </p:cNvCxnSpPr>
           <p:nvPr/>
         </p:nvCxnSpPr>
         <p:spPr>
           <a:xfrm>
-            <a:off x="870270" y="7987784"/>
-            <a:ext cx="1628150" cy="0"/>
+            <a:off x="304800" y="7987784"/>
+            <a:ext cx="2193620" cy="0"/>
           </a:xfrm>
           <a:prstGeom prst="line">
             <a:avLst/>
@@ -10612,10 +10552,9 @@
           <a:lstStyle/>
           <a:p>
             <a:r>
-              <a:rPr lang="en-US" sz="1800" dirty="0" smtClean="0"/>
+              <a:rPr lang="en-US" sz="1800" dirty="0"/>
               <a:t>ch1</a:t>
             </a:r>
-            <a:endParaRPr lang="en-US" sz="1800" dirty="0"/>
           </a:p>
         </p:txBody>
       </p:sp>
@@ -10642,10 +10581,9 @@
           <a:lstStyle/>
           <a:p>
             <a:r>
-              <a:rPr lang="en-US" sz="1800" dirty="0" smtClean="0"/>
+              <a:rPr lang="en-US" sz="1800" dirty="0"/>
               <a:t>ch1_enb</a:t>
             </a:r>
-            <a:endParaRPr lang="en-US" sz="1800" dirty="0"/>
           </a:p>
         </p:txBody>
       </p:sp>
@@ -10689,14 +10627,15 @@
         <p:nvCxnSpPr>
           <p:cNvPr id="276" name="Straight Connector 275"/>
           <p:cNvCxnSpPr>
+            <a:cxnSpLocks/>
             <a:endCxn id="279" idx="1"/>
           </p:cNvCxnSpPr>
           <p:nvPr/>
         </p:nvCxnSpPr>
         <p:spPr>
           <a:xfrm>
-            <a:off x="879794" y="8521184"/>
-            <a:ext cx="1628150" cy="0"/>
+            <a:off x="304800" y="8521184"/>
+            <a:ext cx="2203144" cy="0"/>
           </a:xfrm>
           <a:prstGeom prst="line">
             <a:avLst/>
@@ -10746,10 +10685,9 @@
           <a:lstStyle/>
           <a:p>
             <a:r>
-              <a:rPr lang="en-US" sz="1800" dirty="0" smtClean="0"/>
+              <a:rPr lang="en-US" sz="1800" dirty="0"/>
               <a:t>ch2</a:t>
             </a:r>
-            <a:endParaRPr lang="en-US" sz="1800" dirty="0"/>
           </a:p>
         </p:txBody>
       </p:sp>
@@ -10776,10 +10714,9 @@
           <a:lstStyle/>
           <a:p>
             <a:r>
-              <a:rPr lang="en-US" sz="1800" dirty="0" smtClean="0"/>
+              <a:rPr lang="en-US" sz="1800" dirty="0"/>
               <a:t>ch2_enb</a:t>
             </a:r>
-            <a:endParaRPr lang="en-US" sz="1800" dirty="0"/>
           </a:p>
         </p:txBody>
       </p:sp>
@@ -10807,12 +10744,8 @@
           <a:p>
             <a:pPr algn="r"/>
             <a:r>
-              <a:rPr lang="en-US" sz="1800" dirty="0" smtClean="0"/>
-              <a:t>ch</a:t>
-            </a:r>
-            <a:r>
               <a:rPr lang="en-US" sz="1800" dirty="0"/>
-              <a:t>1</a:t>
+              <a:t>ch1</a:t>
             </a:r>
           </a:p>
         </p:txBody>
@@ -10825,26 +10758,24 @@
         </p:nvSpPr>
         <p:spPr>
           <a:xfrm>
-            <a:off x="457200" y="7675969"/>
-            <a:ext cx="1022670" cy="369332"/>
-          </a:xfrm>
-          <a:prstGeom prst="rect">
-            <a:avLst/>
-          </a:prstGeom>
-          <a:noFill/>
-        </p:spPr>
-        <p:txBody>
-          <a:bodyPr wrap="square" lIns="91440" tIns="45720" rIns="91440" bIns="45720" rtlCol="0">
-            <a:spAutoFit/>
-          </a:bodyPr>
-          <a:lstStyle/>
-          <a:p>
-            <a:pPr algn="r"/>
-            <a:r>
-              <a:rPr lang="en-US" sz="1800" dirty="0" smtClean="0"/>
-              <a:t>ch1_enb</a:t>
-            </a:r>
-            <a:endParaRPr lang="en-US" sz="1800" dirty="0"/>
+            <a:off x="88182" y="7675969"/>
+            <a:ext cx="1391688" cy="369332"/>
+          </a:xfrm>
+          <a:prstGeom prst="rect">
+            <a:avLst/>
+          </a:prstGeom>
+          <a:noFill/>
+        </p:spPr>
+        <p:txBody>
+          <a:bodyPr wrap="square" lIns="91440" tIns="45720" rIns="91440" bIns="45720" rtlCol="0">
+            <a:spAutoFit/>
+          </a:bodyPr>
+          <a:lstStyle/>
+          <a:p>
+            <a:r>
+              <a:rPr lang="en-US" sz="1800" dirty="0"/>
+              <a:t>Switch(0)</a:t>
+            </a:r>
           </a:p>
         </p:txBody>
       </p:sp>
@@ -10872,10 +10803,9 @@
           <a:p>
             <a:pPr algn="r"/>
             <a:r>
-              <a:rPr lang="en-US" sz="1800" dirty="0" smtClean="0"/>
+              <a:rPr lang="en-US" sz="1800" dirty="0"/>
               <a:t>ch2</a:t>
             </a:r>
-            <a:endParaRPr lang="en-US" sz="1800" dirty="0"/>
           </a:p>
         </p:txBody>
       </p:sp>
@@ -10887,26 +10817,24 @@
         </p:nvSpPr>
         <p:spPr>
           <a:xfrm>
-            <a:off x="466724" y="8209369"/>
-            <a:ext cx="1022670" cy="369332"/>
-          </a:xfrm>
-          <a:prstGeom prst="rect">
-            <a:avLst/>
-          </a:prstGeom>
-          <a:noFill/>
-        </p:spPr>
-        <p:txBody>
-          <a:bodyPr wrap="square" lIns="91440" tIns="45720" rIns="91440" bIns="45720" rtlCol="0">
-            <a:spAutoFit/>
-          </a:bodyPr>
-          <a:lstStyle/>
-          <a:p>
-            <a:pPr algn="r"/>
-            <a:r>
-              <a:rPr lang="en-US" sz="1800" dirty="0" smtClean="0"/>
-              <a:t>ch2_enb</a:t>
-            </a:r>
-            <a:endParaRPr lang="en-US" sz="1800" dirty="0"/>
+            <a:off x="87385" y="8196171"/>
+            <a:ext cx="1402009" cy="382530"/>
+          </a:xfrm>
+          <a:prstGeom prst="rect">
+            <a:avLst/>
+          </a:prstGeom>
+          <a:noFill/>
+        </p:spPr>
+        <p:txBody>
+          <a:bodyPr wrap="square" lIns="91440" tIns="45720" rIns="91440" bIns="45720" rtlCol="0">
+            <a:spAutoFit/>
+          </a:bodyPr>
+          <a:lstStyle/>
+          <a:p>
+            <a:r>
+              <a:rPr lang="en-US" sz="1800" dirty="0"/>
+              <a:t>Switch(1)</a:t>
+            </a:r>
           </a:p>
         </p:txBody>
       </p:sp>
@@ -10934,12 +10862,8 @@
           <a:p>
             <a:pPr algn="r"/>
             <a:r>
-              <a:rPr lang="en-US" sz="1800" dirty="0" smtClean="0"/>
-              <a:t>ch</a:t>
-            </a:r>
-            <a:r>
               <a:rPr lang="en-US" sz="1800" dirty="0"/>
-              <a:t>1</a:t>
+              <a:t>ch1</a:t>
             </a:r>
           </a:p>
         </p:txBody>
@@ -10968,10 +10892,9 @@
           <a:p>
             <a:pPr algn="r"/>
             <a:r>
-              <a:rPr lang="en-US" sz="1800" dirty="0" smtClean="0"/>
+              <a:rPr lang="en-US" sz="1800" dirty="0"/>
               <a:t>ch1_enb</a:t>
             </a:r>
-            <a:endParaRPr lang="en-US" sz="1800" dirty="0"/>
           </a:p>
         </p:txBody>
       </p:sp>
@@ -10999,10 +10922,9 @@
           <a:p>
             <a:pPr algn="r"/>
             <a:r>
-              <a:rPr lang="en-US" sz="1800" dirty="0" smtClean="0"/>
+              <a:rPr lang="en-US" sz="1800" dirty="0"/>
               <a:t>ch2</a:t>
             </a:r>
-            <a:endParaRPr lang="en-US" sz="1800" dirty="0"/>
           </a:p>
         </p:txBody>
       </p:sp>
@@ -11030,10 +10952,9 @@
           <a:p>
             <a:pPr algn="r"/>
             <a:r>
-              <a:rPr lang="en-US" sz="1800" dirty="0" smtClean="0"/>
+              <a:rPr lang="en-US" sz="1800" dirty="0"/>
               <a:t>ch2_enb</a:t>
             </a:r>
-            <a:endParaRPr lang="en-US" sz="1800" dirty="0"/>
           </a:p>
         </p:txBody>
       </p:sp>
@@ -11098,7 +11019,7 @@
           <a:lstStyle/>
           <a:p>
             <a:r>
-              <a:rPr lang="en-US" sz="1800" dirty="0" err="1" smtClean="0"/>
+              <a:rPr lang="en-US" sz="1800" dirty="0" err="1"/>
               <a:t>btn</a:t>
             </a:r>
             <a:endParaRPr lang="en-US" sz="1800" dirty="0"/>
@@ -11204,7 +11125,7 @@
           <a:lstStyle/>
           <a:p>
             <a:r>
-              <a:rPr lang="en-US" sz="1800" dirty="0" err="1" smtClean="0"/>
+              <a:rPr lang="en-US" sz="1800" dirty="0" err="1"/>
               <a:t>clk</a:t>
             </a:r>
             <a:endParaRPr lang="en-US" sz="1800" dirty="0"/>
@@ -11264,7 +11185,7 @@
           <a:lstStyle/>
           <a:p>
             <a:r>
-              <a:rPr lang="en-US" sz="1800" dirty="0" err="1" smtClean="0"/>
+              <a:rPr lang="en-US" sz="1800" dirty="0" err="1"/>
               <a:t>clk</a:t>
             </a:r>
             <a:endParaRPr lang="en-US" sz="1800" dirty="0"/>
@@ -11398,7 +11319,7 @@
           <a:lstStyle/>
           <a:p>
             <a:r>
-              <a:rPr lang="en-US" sz="1800" dirty="0" err="1" smtClean="0"/>
+              <a:rPr lang="en-US" sz="1800" dirty="0" err="1"/>
               <a:t>tr_volt</a:t>
             </a:r>
             <a:endParaRPr lang="en-US" sz="1800" dirty="0"/>
@@ -11428,7 +11349,7 @@
           <a:lstStyle/>
           <a:p>
             <a:r>
-              <a:rPr lang="en-US" sz="1800" dirty="0" err="1" smtClean="0"/>
+              <a:rPr lang="en-US" sz="1800" dirty="0" err="1"/>
               <a:t>tr_time</a:t>
             </a:r>
             <a:endParaRPr lang="en-US" sz="1800" dirty="0"/>
@@ -11459,7 +11380,7 @@
           <a:p>
             <a:pPr algn="r"/>
             <a:r>
-              <a:rPr lang="en-US" sz="1800" dirty="0" err="1" smtClean="0"/>
+              <a:rPr lang="en-US" sz="1800" dirty="0" err="1"/>
               <a:t>tr_volt</a:t>
             </a:r>
             <a:endParaRPr lang="en-US" sz="1800" dirty="0"/>
@@ -11521,7 +11442,7 @@
           <a:p>
             <a:pPr algn="r"/>
             <a:r>
-              <a:rPr lang="en-US" sz="1800" dirty="0" err="1" smtClean="0"/>
+              <a:rPr lang="en-US" sz="1800" dirty="0" err="1"/>
               <a:t>tr_volt</a:t>
             </a:r>
             <a:endParaRPr lang="en-US" sz="1800" dirty="0"/>
@@ -11618,7 +11539,7 @@
           <a:lstStyle/>
           <a:p>
             <a:r>
-              <a:rPr lang="en-US" sz="1800" dirty="0" err="1" smtClean="0"/>
+              <a:rPr lang="en-US" sz="1800" dirty="0" err="1"/>
               <a:t>Serialize_clk_n</a:t>
             </a:r>
             <a:endParaRPr lang="en-US" sz="1800" dirty="0"/>
@@ -11684,7 +11605,7 @@
           <a:lstStyle/>
           <a:p>
             <a:r>
-              <a:rPr lang="en-US" sz="1800" dirty="0" err="1" smtClean="0"/>
+              <a:rPr lang="en-US" sz="1800" dirty="0" err="1"/>
               <a:t>Serialize_clk</a:t>
             </a:r>
             <a:endParaRPr lang="en-US" sz="1800" dirty="0"/>
@@ -11808,7 +11729,7 @@
           </a:lstStyle>
           <a:p>
             <a:r>
-              <a:rPr lang="en-US" sz="1800" dirty="0" err="1" smtClean="0"/>
+              <a:rPr lang="en-US" sz="1800" dirty="0" err="1"/>
               <a:t>tmds</a:t>
             </a:r>
             <a:endParaRPr lang="en-US" sz="1800" dirty="0"/>
@@ -11932,7 +11853,7 @@
           </a:lstStyle>
           <a:p>
             <a:r>
-              <a:rPr lang="en-US" sz="1800" dirty="0" err="1" smtClean="0"/>
+              <a:rPr lang="en-US" sz="1800" dirty="0" err="1"/>
               <a:t>tmdsb</a:t>
             </a:r>
             <a:endParaRPr lang="en-US" sz="1800" dirty="0"/>
@@ -11949,13 +11870,6 @@
   <p:clrMapOvr>
     <a:masterClrMapping/>
   </p:clrMapOvr>
-  <p:timing>
-    <p:tnLst>
-      <p:par>
-        <p:cTn id="1" dur="indefinite" restart="never" nodeType="tmRoot"/>
-      </p:par>
-    </p:tnLst>
-  </p:timing>
 </p:sld>
 </file>
 

</xml_diff>